<commit_message>
updates to files and create lesson 4 worksheet
</commit_message>
<xml_diff>
--- a/Session 2/Python - Session 2 May 2019.pptx
+++ b/Session 2/Python - Session 2 May 2019.pptx
@@ -8236,7 +8236,16 @@
                 </a:solidFill>
                 <a:latin typeface="Gill Sans"/>
               </a:rPr>
-              <a:t>SESSION – 3</a:t>
+              <a:t>SESSION </a:t>
+            </a:r>
+            <a:r>
+              <a:rPr lang="fr-FR" sz="2800" b="1" strike="noStrike" cap="all" spc="-1">
+                <a:solidFill>
+                  <a:srgbClr val="073A76"/>
+                </a:solidFill>
+                <a:latin typeface="Gill Sans"/>
+              </a:rPr>
+              <a:t>– 2</a:t>
             </a:r>
             <a:br>
               <a:rPr dirty="0"/>

</xml_diff>